<commit_message>
update report and mini detail to product
</commit_message>
<xml_diff>
--- a/Report/Report_2.pptx
+++ b/Report/Report_2.pptx
@@ -8,19 +8,24 @@
     <p:sldId id="256" r:id="rId2"/>
     <p:sldId id="268" r:id="rId3"/>
     <p:sldId id="269" r:id="rId4"/>
-    <p:sldId id="267" r:id="rId5"/>
-    <p:sldId id="257" r:id="rId6"/>
-    <p:sldId id="258" r:id="rId7"/>
-    <p:sldId id="259" r:id="rId8"/>
-    <p:sldId id="260" r:id="rId9"/>
-    <p:sldId id="270" r:id="rId10"/>
-    <p:sldId id="271" r:id="rId11"/>
-    <p:sldId id="272" r:id="rId12"/>
-    <p:sldId id="273" r:id="rId13"/>
-    <p:sldId id="263" r:id="rId14"/>
-    <p:sldId id="261" r:id="rId15"/>
-    <p:sldId id="265" r:id="rId16"/>
-    <p:sldId id="266" r:id="rId17"/>
+    <p:sldId id="274" r:id="rId5"/>
+    <p:sldId id="275" r:id="rId6"/>
+    <p:sldId id="276" r:id="rId7"/>
+    <p:sldId id="267" r:id="rId8"/>
+    <p:sldId id="257" r:id="rId9"/>
+    <p:sldId id="258" r:id="rId10"/>
+    <p:sldId id="259" r:id="rId11"/>
+    <p:sldId id="260" r:id="rId12"/>
+    <p:sldId id="270" r:id="rId13"/>
+    <p:sldId id="271" r:id="rId14"/>
+    <p:sldId id="272" r:id="rId15"/>
+    <p:sldId id="273" r:id="rId16"/>
+    <p:sldId id="277" r:id="rId17"/>
+    <p:sldId id="278" r:id="rId18"/>
+    <p:sldId id="263" r:id="rId19"/>
+    <p:sldId id="261" r:id="rId20"/>
+    <p:sldId id="265" r:id="rId21"/>
+    <p:sldId id="266" r:id="rId22"/>
   </p:sldIdLst>
   <p:sldSz cx="9144000" cy="6858000" type="screen4x3"/>
   <p:notesSz cx="6858000" cy="9144000"/>
@@ -127,6 +132,10 @@
 </p:presentation>
 </file>
 
+<file path=ppt/revisionInfo.xml><?xml version="1.0" encoding="utf-8"?>
+<p1510:revInfo xmlns:a="http://schemas.openxmlformats.org/drawingml/2006/main" xmlns:r="http://schemas.openxmlformats.org/officeDocument/2006/relationships" xmlns:p1510="http://schemas.microsoft.com/office/powerpoint/2015/10/main"/>
+</file>
+
 <file path=ppt/slideLayouts/slideLayout1.xml><?xml version="1.0" encoding="utf-8"?>
 <p:sldLayout xmlns:a="http://schemas.openxmlformats.org/drawingml/2006/main" xmlns:r="http://schemas.openxmlformats.org/officeDocument/2006/relationships" xmlns:p="http://schemas.openxmlformats.org/presentationml/2006/main" showMasterSp="0" type="title" preserve="1">
   <p:cSld name="Title Slide">
@@ -352,7 +361,7 @@
             <a:fld id="{5586B75A-687E-405C-8A0B-8D00578BA2C3}" type="datetimeFigureOut">
               <a:rPr lang="en-US" smtClean="0"/>
               <a:pPr/>
-              <a:t>5/11/2017</a:t>
+              <a:t>5/12/2017</a:t>
             </a:fld>
             <a:endParaRPr lang="en-US" dirty="0"/>
           </a:p>
@@ -524,7 +533,7 @@
             <a:fld id="{5586B75A-687E-405C-8A0B-8D00578BA2C3}" type="datetimeFigureOut">
               <a:rPr lang="en-US" smtClean="0"/>
               <a:pPr/>
-              <a:t>5/11/2017</a:t>
+              <a:t>5/12/2017</a:t>
             </a:fld>
             <a:endParaRPr lang="en-US" dirty="0"/>
           </a:p>
@@ -706,7 +715,7 @@
             <a:fld id="{5586B75A-687E-405C-8A0B-8D00578BA2C3}" type="datetimeFigureOut">
               <a:rPr lang="en-US" smtClean="0"/>
               <a:pPr/>
-              <a:t>5/11/2017</a:t>
+              <a:t>5/12/2017</a:t>
             </a:fld>
             <a:endParaRPr lang="en-US" dirty="0"/>
           </a:p>
@@ -878,7 +887,7 @@
             <a:fld id="{5586B75A-687E-405C-8A0B-8D00578BA2C3}" type="datetimeFigureOut">
               <a:rPr lang="en-US" smtClean="0"/>
               <a:pPr/>
-              <a:t>5/11/2017</a:t>
+              <a:t>5/12/2017</a:t>
             </a:fld>
             <a:endParaRPr lang="en-US" dirty="0"/>
           </a:p>
@@ -1138,7 +1147,7 @@
             <a:fld id="{5586B75A-687E-405C-8A0B-8D00578BA2C3}" type="datetimeFigureOut">
               <a:rPr lang="en-US" smtClean="0"/>
               <a:pPr/>
-              <a:t>5/11/2017</a:t>
+              <a:t>5/12/2017</a:t>
             </a:fld>
             <a:endParaRPr lang="en-US" dirty="0"/>
           </a:p>
@@ -1428,7 +1437,7 @@
             <a:fld id="{5586B75A-687E-405C-8A0B-8D00578BA2C3}" type="datetimeFigureOut">
               <a:rPr lang="en-US" smtClean="0"/>
               <a:pPr/>
-              <a:t>5/11/2017</a:t>
+              <a:t>5/12/2017</a:t>
             </a:fld>
             <a:endParaRPr lang="en-US" dirty="0"/>
           </a:p>
@@ -1872,7 +1881,7 @@
             <a:fld id="{5586B75A-687E-405C-8A0B-8D00578BA2C3}" type="datetimeFigureOut">
               <a:rPr lang="en-US" smtClean="0"/>
               <a:pPr/>
-              <a:t>5/11/2017</a:t>
+              <a:t>5/12/2017</a:t>
             </a:fld>
             <a:endParaRPr lang="en-US" dirty="0"/>
           </a:p>
@@ -1992,7 +2001,7 @@
             <a:fld id="{5586B75A-687E-405C-8A0B-8D00578BA2C3}" type="datetimeFigureOut">
               <a:rPr lang="en-US" smtClean="0"/>
               <a:pPr/>
-              <a:t>5/11/2017</a:t>
+              <a:t>5/12/2017</a:t>
             </a:fld>
             <a:endParaRPr lang="en-US" dirty="0"/>
           </a:p>
@@ -2089,7 +2098,7 @@
             <a:fld id="{5586B75A-687E-405C-8A0B-8D00578BA2C3}" type="datetimeFigureOut">
               <a:rPr lang="en-US" smtClean="0"/>
               <a:pPr/>
-              <a:t>5/11/2017</a:t>
+              <a:t>5/12/2017</a:t>
             </a:fld>
             <a:endParaRPr lang="en-US" dirty="0"/>
           </a:p>
@@ -2382,7 +2391,7 @@
             <a:fld id="{5586B75A-687E-405C-8A0B-8D00578BA2C3}" type="datetimeFigureOut">
               <a:rPr lang="en-US" smtClean="0"/>
               <a:pPr/>
-              <a:t>5/11/2017</a:t>
+              <a:t>5/12/2017</a:t>
             </a:fld>
             <a:endParaRPr lang="en-US" dirty="0"/>
           </a:p>
@@ -2660,7 +2669,7 @@
             <a:fld id="{5586B75A-687E-405C-8A0B-8D00578BA2C3}" type="datetimeFigureOut">
               <a:rPr lang="en-US" smtClean="0"/>
               <a:pPr/>
-              <a:t>5/11/2017</a:t>
+              <a:t>5/12/2017</a:t>
             </a:fld>
             <a:endParaRPr lang="en-US" dirty="0"/>
           </a:p>
@@ -2959,7 +2968,7 @@
             <a:fld id="{5586B75A-687E-405C-8A0B-8D00578BA2C3}" type="datetimeFigureOut">
               <a:rPr lang="en-US" smtClean="0"/>
               <a:pPr/>
-              <a:t>5/11/2017</a:t>
+              <a:t>5/12/2017</a:t>
             </a:fld>
             <a:endParaRPr lang="en-US" dirty="0"/>
           </a:p>
@@ -3512,6 +3521,238 @@
           <a:p>
             <a:r>
               <a:rPr lang="vi-VN" dirty="0"/>
+              <a:t>ERD</a:t>
+            </a:r>
+          </a:p>
+        </p:txBody>
+      </p:sp>
+      <p:pic>
+        <p:nvPicPr>
+          <p:cNvPr id="5" name="Content Placeholder 4"/>
+          <p:cNvPicPr>
+            <a:picLocks noGrp="1" noChangeAspect="1"/>
+          </p:cNvPicPr>
+          <p:nvPr>
+            <p:ph idx="1"/>
+          </p:nvPr>
+        </p:nvPicPr>
+        <p:blipFill>
+          <a:blip r:embed="rId2"/>
+          <a:stretch>
+            <a:fillRect/>
+          </a:stretch>
+        </p:blipFill>
+        <p:spPr>
+          <a:xfrm>
+            <a:off x="2703443" y="265043"/>
+            <a:ext cx="5684907" cy="6042992"/>
+          </a:xfrm>
+        </p:spPr>
+      </p:pic>
+    </p:spTree>
+    <p:extLst>
+      <p:ext uri="{BB962C8B-B14F-4D97-AF65-F5344CB8AC3E}">
+        <p14:creationId xmlns:p14="http://schemas.microsoft.com/office/powerpoint/2010/main" val="606729081"/>
+      </p:ext>
+    </p:extLst>
+  </p:cSld>
+  <p:clrMapOvr>
+    <a:masterClrMapping/>
+  </p:clrMapOvr>
+</p:sld>
+</file>
+
+<file path=ppt/slides/slide11.xml><?xml version="1.0" encoding="utf-8"?>
+<p:sld xmlns:a="http://schemas.openxmlformats.org/drawingml/2006/main" xmlns:r="http://schemas.openxmlformats.org/officeDocument/2006/relationships" xmlns:p="http://schemas.openxmlformats.org/presentationml/2006/main">
+  <p:cSld>
+    <p:spTree>
+      <p:nvGrpSpPr>
+        <p:cNvPr id="1" name=""/>
+        <p:cNvGrpSpPr/>
+        <p:nvPr/>
+      </p:nvGrpSpPr>
+      <p:grpSpPr>
+        <a:xfrm>
+          <a:off x="0" y="0"/>
+          <a:ext cx="0" cy="0"/>
+          <a:chOff x="0" y="0"/>
+          <a:chExt cx="0" cy="0"/>
+        </a:xfrm>
+      </p:grpSpPr>
+      <p:sp>
+        <p:nvSpPr>
+          <p:cNvPr id="2" name="Title 1"/>
+          <p:cNvSpPr>
+            <a:spLocks noGrp="1"/>
+          </p:cNvSpPr>
+          <p:nvPr>
+            <p:ph type="title"/>
+          </p:nvPr>
+        </p:nvSpPr>
+        <p:spPr/>
+        <p:txBody>
+          <a:bodyPr/>
+          <a:lstStyle/>
+          <a:p>
+            <a:r>
+              <a:rPr lang="vi-VN" dirty="0"/>
+              <a:t>UML</a:t>
+            </a:r>
+          </a:p>
+        </p:txBody>
+      </p:sp>
+      <p:pic>
+        <p:nvPicPr>
+          <p:cNvPr id="7" name="Content Placeholder 6"/>
+          <p:cNvPicPr>
+            <a:picLocks noGrp="1" noChangeAspect="1"/>
+          </p:cNvPicPr>
+          <p:nvPr>
+            <p:ph idx="1"/>
+          </p:nvPr>
+        </p:nvPicPr>
+        <p:blipFill>
+          <a:blip r:embed="rId2"/>
+          <a:stretch>
+            <a:fillRect/>
+          </a:stretch>
+        </p:blipFill>
+        <p:spPr>
+          <a:xfrm>
+            <a:off x="2901950" y="410817"/>
+            <a:ext cx="5486400" cy="5645426"/>
+          </a:xfrm>
+        </p:spPr>
+      </p:pic>
+    </p:spTree>
+    <p:extLst>
+      <p:ext uri="{BB962C8B-B14F-4D97-AF65-F5344CB8AC3E}">
+        <p14:creationId xmlns:p14="http://schemas.microsoft.com/office/powerpoint/2010/main" val="1998424779"/>
+      </p:ext>
+    </p:extLst>
+  </p:cSld>
+  <p:clrMapOvr>
+    <a:masterClrMapping/>
+  </p:clrMapOvr>
+</p:sld>
+</file>
+
+<file path=ppt/slides/slide12.xml><?xml version="1.0" encoding="utf-8"?>
+<p:sld xmlns:a="http://schemas.openxmlformats.org/drawingml/2006/main" xmlns:r="http://schemas.openxmlformats.org/officeDocument/2006/relationships" xmlns:p="http://schemas.openxmlformats.org/presentationml/2006/main">
+  <p:cSld>
+    <p:spTree>
+      <p:nvGrpSpPr>
+        <p:cNvPr id="1" name=""/>
+        <p:cNvGrpSpPr/>
+        <p:nvPr/>
+      </p:nvGrpSpPr>
+      <p:grpSpPr>
+        <a:xfrm>
+          <a:off x="0" y="0"/>
+          <a:ext cx="0" cy="0"/>
+          <a:chOff x="0" y="0"/>
+          <a:chExt cx="0" cy="0"/>
+        </a:xfrm>
+      </p:grpSpPr>
+      <p:sp>
+        <p:nvSpPr>
+          <p:cNvPr id="2" name="Title 1"/>
+          <p:cNvSpPr>
+            <a:spLocks noGrp="1"/>
+          </p:cNvSpPr>
+          <p:nvPr>
+            <p:ph type="title"/>
+          </p:nvPr>
+        </p:nvSpPr>
+        <p:spPr/>
+        <p:txBody>
+          <a:bodyPr/>
+          <a:lstStyle/>
+          <a:p>
+            <a:r>
+              <a:rPr lang="vi-VN" dirty="0"/>
+              <a:t>Login Sequence</a:t>
+            </a:r>
+            <a:br>
+              <a:rPr lang="vi-VN" dirty="0"/>
+            </a:br>
+            <a:r>
+              <a:rPr lang="vi-VN" dirty="0"/>
+              <a:t>diagram</a:t>
+            </a:r>
+          </a:p>
+        </p:txBody>
+      </p:sp>
+      <p:pic>
+        <p:nvPicPr>
+          <p:cNvPr id="5" name="Content Placeholder 4" descr="A picture containing screenshot&#10;&#10;Description generated with very high confidence"/>
+          <p:cNvPicPr>
+            <a:picLocks noGrp="1" noChangeAspect="1"/>
+          </p:cNvPicPr>
+          <p:nvPr>
+            <p:ph idx="1"/>
+          </p:nvPr>
+        </p:nvPicPr>
+        <p:blipFill>
+          <a:blip r:embed="rId2"/>
+          <a:stretch>
+            <a:fillRect/>
+          </a:stretch>
+        </p:blipFill>
+        <p:spPr>
+          <a:xfrm>
+            <a:off x="2716419" y="692363"/>
+            <a:ext cx="5802634" cy="4873549"/>
+          </a:xfrm>
+        </p:spPr>
+      </p:pic>
+    </p:spTree>
+    <p:extLst>
+      <p:ext uri="{BB962C8B-B14F-4D97-AF65-F5344CB8AC3E}">
+        <p14:creationId xmlns:p14="http://schemas.microsoft.com/office/powerpoint/2010/main" val="2184775498"/>
+      </p:ext>
+    </p:extLst>
+  </p:cSld>
+  <p:clrMapOvr>
+    <a:masterClrMapping/>
+  </p:clrMapOvr>
+</p:sld>
+</file>
+
+<file path=ppt/slides/slide13.xml><?xml version="1.0" encoding="utf-8"?>
+<p:sld xmlns:a="http://schemas.openxmlformats.org/drawingml/2006/main" xmlns:r="http://schemas.openxmlformats.org/officeDocument/2006/relationships" xmlns:p="http://schemas.openxmlformats.org/presentationml/2006/main">
+  <p:cSld>
+    <p:spTree>
+      <p:nvGrpSpPr>
+        <p:cNvPr id="1" name=""/>
+        <p:cNvGrpSpPr/>
+        <p:nvPr/>
+      </p:nvGrpSpPr>
+      <p:grpSpPr>
+        <a:xfrm>
+          <a:off x="0" y="0"/>
+          <a:ext cx="0" cy="0"/>
+          <a:chOff x="0" y="0"/>
+          <a:chExt cx="0" cy="0"/>
+        </a:xfrm>
+      </p:grpSpPr>
+      <p:sp>
+        <p:nvSpPr>
+          <p:cNvPr id="2" name="Title 1"/>
+          <p:cNvSpPr>
+            <a:spLocks noGrp="1"/>
+          </p:cNvSpPr>
+          <p:nvPr>
+            <p:ph type="title"/>
+          </p:nvPr>
+        </p:nvSpPr>
+        <p:spPr/>
+        <p:txBody>
+          <a:bodyPr/>
+          <a:lstStyle/>
+          <a:p>
+            <a:r>
+              <a:rPr lang="vi-VN" dirty="0"/>
               <a:t>Create product</a:t>
             </a:r>
             <a:br>
@@ -3567,7 +3808,7 @@
 </p:sld>
 </file>
 
-<file path=ppt/slides/slide11.xml><?xml version="1.0" encoding="utf-8"?>
+<file path=ppt/slides/slide14.xml><?xml version="1.0" encoding="utf-8"?>
 <p:sld xmlns:a="http://schemas.openxmlformats.org/drawingml/2006/main" xmlns:r="http://schemas.openxmlformats.org/officeDocument/2006/relationships" xmlns:p="http://schemas.openxmlformats.org/presentationml/2006/main">
   <p:cSld>
     <p:spTree>
@@ -3656,7 +3897,7 @@
 </p:sld>
 </file>
 
-<file path=ppt/slides/slide12.xml><?xml version="1.0" encoding="utf-8"?>
+<file path=ppt/slides/slide15.xml><?xml version="1.0" encoding="utf-8"?>
 <p:sld xmlns:a="http://schemas.openxmlformats.org/drawingml/2006/main" xmlns:r="http://schemas.openxmlformats.org/officeDocument/2006/relationships" xmlns:p="http://schemas.openxmlformats.org/presentationml/2006/main">
   <p:cSld>
     <p:spTree>
@@ -3745,7 +3986,161 @@
 </p:sld>
 </file>
 
-<file path=ppt/slides/slide13.xml><?xml version="1.0" encoding="utf-8"?>
+<file path=ppt/slides/slide16.xml><?xml version="1.0" encoding="utf-8"?>
+<p:sld xmlns:a="http://schemas.openxmlformats.org/drawingml/2006/main" xmlns:r="http://schemas.openxmlformats.org/officeDocument/2006/relationships" xmlns:p="http://schemas.openxmlformats.org/presentationml/2006/main">
+  <p:cSld>
+    <p:spTree>
+      <p:nvGrpSpPr>
+        <p:cNvPr id="1" name=""/>
+        <p:cNvGrpSpPr/>
+        <p:nvPr/>
+      </p:nvGrpSpPr>
+      <p:grpSpPr>
+        <a:xfrm>
+          <a:off x="0" y="0"/>
+          <a:ext cx="0" cy="0"/>
+          <a:chOff x="0" y="0"/>
+          <a:chExt cx="0" cy="0"/>
+        </a:xfrm>
+      </p:grpSpPr>
+      <p:sp>
+        <p:nvSpPr>
+          <p:cNvPr id="2" name="Title 1"/>
+          <p:cNvSpPr>
+            <a:spLocks noGrp="1"/>
+          </p:cNvSpPr>
+          <p:nvPr>
+            <p:ph type="title"/>
+          </p:nvPr>
+        </p:nvSpPr>
+        <p:spPr/>
+        <p:txBody>
+          <a:bodyPr/>
+          <a:lstStyle/>
+          <a:p>
+            <a:r>
+              <a:rPr lang="vi-VN" dirty="0"/>
+              <a:t>New import</a:t>
+            </a:r>
+            <a:br>
+              <a:rPr lang="vi-VN" dirty="0"/>
+            </a:br>
+            <a:r>
+              <a:rPr lang="vi-VN" dirty="0"/>
+              <a:t>sequence diagram</a:t>
+            </a:r>
+          </a:p>
+        </p:txBody>
+      </p:sp>
+      <p:pic>
+        <p:nvPicPr>
+          <p:cNvPr id="5" name="Content Placeholder 4" descr="A picture containing screenshot&#10;&#10;Description generated with very high confidence"/>
+          <p:cNvPicPr>
+            <a:picLocks noGrp="1" noChangeAspect="1"/>
+          </p:cNvPicPr>
+          <p:nvPr>
+            <p:ph idx="1"/>
+          </p:nvPr>
+        </p:nvPicPr>
+        <p:blipFill>
+          <a:blip r:embed="rId2"/>
+          <a:stretch>
+            <a:fillRect/>
+          </a:stretch>
+        </p:blipFill>
+        <p:spPr>
+          <a:xfrm>
+            <a:off x="2901950" y="1646521"/>
+            <a:ext cx="5486400" cy="3555432"/>
+          </a:xfrm>
+        </p:spPr>
+      </p:pic>
+    </p:spTree>
+    <p:extLst>
+      <p:ext uri="{BB962C8B-B14F-4D97-AF65-F5344CB8AC3E}">
+        <p14:creationId xmlns:p14="http://schemas.microsoft.com/office/powerpoint/2010/main" val="3621274743"/>
+      </p:ext>
+    </p:extLst>
+  </p:cSld>
+  <p:clrMapOvr>
+    <a:masterClrMapping/>
+  </p:clrMapOvr>
+</p:sld>
+</file>
+
+<file path=ppt/slides/slide17.xml><?xml version="1.0" encoding="utf-8"?>
+<p:sld xmlns:a="http://schemas.openxmlformats.org/drawingml/2006/main" xmlns:r="http://schemas.openxmlformats.org/officeDocument/2006/relationships" xmlns:p="http://schemas.openxmlformats.org/presentationml/2006/main">
+  <p:cSld>
+    <p:spTree>
+      <p:nvGrpSpPr>
+        <p:cNvPr id="1" name=""/>
+        <p:cNvGrpSpPr/>
+        <p:nvPr/>
+      </p:nvGrpSpPr>
+      <p:grpSpPr>
+        <a:xfrm>
+          <a:off x="0" y="0"/>
+          <a:ext cx="0" cy="0"/>
+          <a:chOff x="0" y="0"/>
+          <a:chExt cx="0" cy="0"/>
+        </a:xfrm>
+      </p:grpSpPr>
+      <p:sp>
+        <p:nvSpPr>
+          <p:cNvPr id="2" name="Title 1"/>
+          <p:cNvSpPr>
+            <a:spLocks noGrp="1"/>
+          </p:cNvSpPr>
+          <p:nvPr>
+            <p:ph type="title"/>
+          </p:nvPr>
+        </p:nvSpPr>
+        <p:spPr/>
+        <p:txBody>
+          <a:bodyPr/>
+          <a:lstStyle/>
+          <a:p>
+            <a:endParaRPr lang="vi-VN"/>
+          </a:p>
+        </p:txBody>
+      </p:sp>
+      <p:pic>
+        <p:nvPicPr>
+          <p:cNvPr id="5" name="Content Placeholder 4" descr="A picture containing screenshot&#10;&#10;Description generated with very high confidence"/>
+          <p:cNvPicPr>
+            <a:picLocks noGrp="1" noChangeAspect="1"/>
+          </p:cNvPicPr>
+          <p:nvPr>
+            <p:ph idx="1"/>
+          </p:nvPr>
+        </p:nvPicPr>
+        <p:blipFill>
+          <a:blip r:embed="rId2"/>
+          <a:stretch>
+            <a:fillRect/>
+          </a:stretch>
+        </p:blipFill>
+        <p:spPr>
+          <a:xfrm>
+            <a:off x="2901950" y="993159"/>
+            <a:ext cx="5486400" cy="4862157"/>
+          </a:xfrm>
+        </p:spPr>
+      </p:pic>
+    </p:spTree>
+    <p:extLst>
+      <p:ext uri="{BB962C8B-B14F-4D97-AF65-F5344CB8AC3E}">
+        <p14:creationId xmlns:p14="http://schemas.microsoft.com/office/powerpoint/2010/main" val="2834211191"/>
+      </p:ext>
+    </p:extLst>
+  </p:cSld>
+  <p:clrMapOvr>
+    <a:masterClrMapping/>
+  </p:clrMapOvr>
+</p:sld>
+</file>
+
+<file path=ppt/slides/slide18.xml><?xml version="1.0" encoding="utf-8"?>
 <p:sld xmlns:a="http://schemas.openxmlformats.org/drawingml/2006/main" xmlns:r="http://schemas.openxmlformats.org/officeDocument/2006/relationships" xmlns:p="http://schemas.openxmlformats.org/presentationml/2006/main">
   <p:cSld>
     <p:spTree>
@@ -3834,7 +4229,7 @@
 </p:sld>
 </file>
 
-<file path=ppt/slides/slide14.xml><?xml version="1.0" encoding="utf-8"?>
+<file path=ppt/slides/slide19.xml><?xml version="1.0" encoding="utf-8"?>
 <p:sld xmlns:a="http://schemas.openxmlformats.org/drawingml/2006/main" xmlns:r="http://schemas.openxmlformats.org/officeDocument/2006/relationships" xmlns:p="http://schemas.openxmlformats.org/presentationml/2006/main">
   <p:cSld>
     <p:spTree>
@@ -3923,7 +4318,123 @@
 </p:sld>
 </file>
 
-<file path=ppt/slides/slide15.xml><?xml version="1.0" encoding="utf-8"?>
+<file path=ppt/slides/slide2.xml><?xml version="1.0" encoding="utf-8"?>
+<p:sld xmlns:a="http://schemas.openxmlformats.org/drawingml/2006/main" xmlns:r="http://schemas.openxmlformats.org/officeDocument/2006/relationships" xmlns:p="http://schemas.openxmlformats.org/presentationml/2006/main">
+  <p:cSld>
+    <p:spTree>
+      <p:nvGrpSpPr>
+        <p:cNvPr id="1" name=""/>
+        <p:cNvGrpSpPr/>
+        <p:nvPr/>
+      </p:nvGrpSpPr>
+      <p:grpSpPr>
+        <a:xfrm>
+          <a:off x="0" y="0"/>
+          <a:ext cx="0" cy="0"/>
+          <a:chOff x="0" y="0"/>
+          <a:chExt cx="0" cy="0"/>
+        </a:xfrm>
+      </p:grpSpPr>
+      <p:sp>
+        <p:nvSpPr>
+          <p:cNvPr id="2" name="Title 1"/>
+          <p:cNvSpPr>
+            <a:spLocks noGrp="1"/>
+          </p:cNvSpPr>
+          <p:nvPr>
+            <p:ph type="title"/>
+          </p:nvPr>
+        </p:nvSpPr>
+        <p:spPr/>
+        <p:txBody>
+          <a:bodyPr/>
+          <a:lstStyle/>
+          <a:p>
+            <a:r>
+              <a:rPr lang="vi-VN" dirty="0"/>
+              <a:t>Introduction</a:t>
+            </a:r>
+          </a:p>
+        </p:txBody>
+      </p:sp>
+      <p:sp>
+        <p:nvSpPr>
+          <p:cNvPr id="3" name="Content Placeholder 2"/>
+          <p:cNvSpPr>
+            <a:spLocks noGrp="1"/>
+          </p:cNvSpPr>
+          <p:nvPr>
+            <p:ph idx="1"/>
+          </p:nvPr>
+        </p:nvSpPr>
+        <p:spPr/>
+        <p:txBody>
+          <a:bodyPr/>
+          <a:lstStyle/>
+          <a:p>
+            <a:r>
+              <a:rPr lang="vi-VN" dirty="0"/>
+              <a:t>Description: this is a system management for drinking shop</a:t>
+            </a:r>
+          </a:p>
+          <a:p>
+            <a:r>
+              <a:rPr lang="vi-VN" dirty="0"/>
+              <a:t>User: Shop owner, shop’s staff</a:t>
+            </a:r>
+          </a:p>
+          <a:p>
+            <a:r>
+              <a:rPr lang="vi-VN" dirty="0"/>
+              <a:t>Function: Managing products, staff, storage, sales</a:t>
+            </a:r>
+          </a:p>
+          <a:p>
+            <a:r>
+              <a:rPr lang="vi-VN" dirty="0"/>
+              <a:t>Team member:</a:t>
+            </a:r>
+          </a:p>
+          <a:p>
+            <a:pPr lvl="1"/>
+            <a:r>
+              <a:rPr lang="vi-VN" dirty="0"/>
+              <a:t>Phạm Vương Triều (leader)</a:t>
+            </a:r>
+          </a:p>
+          <a:p>
+            <a:pPr lvl="1"/>
+            <a:r>
+              <a:rPr lang="vi-VN" dirty="0"/>
+              <a:t>Hoàng Trọng Việt</a:t>
+            </a:r>
+          </a:p>
+          <a:p>
+            <a:pPr lvl="1"/>
+            <a:r>
+              <a:rPr lang="vi-VN" dirty="0"/>
+              <a:t>Huỳnh Đặng Công Khánh</a:t>
+            </a:r>
+          </a:p>
+          <a:p>
+            <a:endParaRPr lang="vi-VN" dirty="0"/>
+          </a:p>
+        </p:txBody>
+      </p:sp>
+    </p:spTree>
+    <p:extLst>
+      <p:ext uri="{BB962C8B-B14F-4D97-AF65-F5344CB8AC3E}">
+        <p14:creationId xmlns:p14="http://schemas.microsoft.com/office/powerpoint/2010/main" val="2307719708"/>
+      </p:ext>
+    </p:extLst>
+  </p:cSld>
+  <p:clrMapOvr>
+    <a:masterClrMapping/>
+  </p:clrMapOvr>
+</p:sld>
+</file>
+
+<file path=ppt/slides/slide20.xml><?xml version="1.0" encoding="utf-8"?>
 <p:sld xmlns:a="http://schemas.openxmlformats.org/drawingml/2006/main" xmlns:r="http://schemas.openxmlformats.org/officeDocument/2006/relationships" xmlns:p="http://schemas.openxmlformats.org/presentationml/2006/main">
   <p:cSld>
     <p:spTree>
@@ -4012,7 +4523,7 @@
 </p:sld>
 </file>
 
-<file path=ppt/slides/slide16.xml><?xml version="1.0" encoding="utf-8"?>
+<file path=ppt/slides/slide21.xml><?xml version="1.0" encoding="utf-8"?>
 <p:sld xmlns:a="http://schemas.openxmlformats.org/drawingml/2006/main" xmlns:r="http://schemas.openxmlformats.org/officeDocument/2006/relationships" xmlns:p="http://schemas.openxmlformats.org/presentationml/2006/main">
   <p:cSld>
     <p:spTree>
@@ -4065,145 +4576,33 @@
           </a:p>
         </p:txBody>
       </p:sp>
-      <p:sp>
-        <p:nvSpPr>
-          <p:cNvPr id="4" name="Content Placeholder 3"/>
-          <p:cNvSpPr>
-            <a:spLocks noGrp="1"/>
-          </p:cNvSpPr>
+      <p:pic>
+        <p:nvPicPr>
+          <p:cNvPr id="5" name="Content Placeholder 4" descr="A picture containing screenshot&#10;&#10;Description generated with very high confidence"/>
+          <p:cNvPicPr>
+            <a:picLocks noGrp="1" noChangeAspect="1"/>
+          </p:cNvPicPr>
           <p:nvPr>
             <p:ph idx="1"/>
           </p:nvPr>
-        </p:nvSpPr>
-        <p:spPr/>
-        <p:txBody>
-          <a:bodyPr/>
-          <a:lstStyle/>
-          <a:p>
-            <a:endParaRPr lang="vi-VN"/>
-          </a:p>
-        </p:txBody>
-      </p:sp>
+        </p:nvPicPr>
+        <p:blipFill>
+          <a:blip r:embed="rId2"/>
+          <a:stretch>
+            <a:fillRect/>
+          </a:stretch>
+        </p:blipFill>
+        <p:spPr>
+          <a:xfrm>
+            <a:off x="2901950" y="1197724"/>
+            <a:ext cx="5486400" cy="4453026"/>
+          </a:xfrm>
+        </p:spPr>
+      </p:pic>
     </p:spTree>
     <p:extLst>
       <p:ext uri="{BB962C8B-B14F-4D97-AF65-F5344CB8AC3E}">
         <p14:creationId xmlns:p14="http://schemas.microsoft.com/office/powerpoint/2010/main" val="1790143292"/>
-      </p:ext>
-    </p:extLst>
-  </p:cSld>
-  <p:clrMapOvr>
-    <a:masterClrMapping/>
-  </p:clrMapOvr>
-</p:sld>
-</file>
-
-<file path=ppt/slides/slide2.xml><?xml version="1.0" encoding="utf-8"?>
-<p:sld xmlns:a="http://schemas.openxmlformats.org/drawingml/2006/main" xmlns:r="http://schemas.openxmlformats.org/officeDocument/2006/relationships" xmlns:p="http://schemas.openxmlformats.org/presentationml/2006/main">
-  <p:cSld>
-    <p:spTree>
-      <p:nvGrpSpPr>
-        <p:cNvPr id="1" name=""/>
-        <p:cNvGrpSpPr/>
-        <p:nvPr/>
-      </p:nvGrpSpPr>
-      <p:grpSpPr>
-        <a:xfrm>
-          <a:off x="0" y="0"/>
-          <a:ext cx="0" cy="0"/>
-          <a:chOff x="0" y="0"/>
-          <a:chExt cx="0" cy="0"/>
-        </a:xfrm>
-      </p:grpSpPr>
-      <p:sp>
-        <p:nvSpPr>
-          <p:cNvPr id="2" name="Title 1"/>
-          <p:cNvSpPr>
-            <a:spLocks noGrp="1"/>
-          </p:cNvSpPr>
-          <p:nvPr>
-            <p:ph type="title"/>
-          </p:nvPr>
-        </p:nvSpPr>
-        <p:spPr/>
-        <p:txBody>
-          <a:bodyPr/>
-          <a:lstStyle/>
-          <a:p>
-            <a:r>
-              <a:rPr lang="vi-VN" dirty="0"/>
-              <a:t>Introduction</a:t>
-            </a:r>
-          </a:p>
-        </p:txBody>
-      </p:sp>
-      <p:sp>
-        <p:nvSpPr>
-          <p:cNvPr id="3" name="Content Placeholder 2"/>
-          <p:cNvSpPr>
-            <a:spLocks noGrp="1"/>
-          </p:cNvSpPr>
-          <p:nvPr>
-            <p:ph idx="1"/>
-          </p:nvPr>
-        </p:nvSpPr>
-        <p:spPr/>
-        <p:txBody>
-          <a:bodyPr/>
-          <a:lstStyle/>
-          <a:p>
-            <a:r>
-              <a:rPr lang="vi-VN" dirty="0"/>
-              <a:t>Description: this is a system management for drinking shop</a:t>
-            </a:r>
-          </a:p>
-          <a:p>
-            <a:r>
-              <a:rPr lang="vi-VN" dirty="0"/>
-              <a:t>User: Shop owner, shop’s staff</a:t>
-            </a:r>
-          </a:p>
-          <a:p>
-            <a:r>
-              <a:rPr lang="vi-VN" dirty="0"/>
-              <a:t>Function: Managing products, staff, storage, sales</a:t>
-            </a:r>
-          </a:p>
-          <a:p>
-            <a:r>
-              <a:rPr lang="vi-VN" dirty="0"/>
-              <a:t>Team member:</a:t>
-            </a:r>
-          </a:p>
-          <a:p>
-            <a:pPr lvl="1"/>
-            <a:r>
-              <a:rPr lang="vi-VN" dirty="0"/>
-              <a:t>Phạm Vương Triều (leader)</a:t>
-            </a:r>
-          </a:p>
-          <a:p>
-            <a:pPr lvl="1"/>
-            <a:r>
-              <a:rPr lang="vi-VN" dirty="0"/>
-              <a:t>Hoàng Trọng Việt</a:t>
-            </a:r>
-          </a:p>
-          <a:p>
-            <a:pPr lvl="1"/>
-            <a:r>
-              <a:rPr lang="vi-VN" dirty="0"/>
-              <a:t>Huỳnh Đặng Công Khánh</a:t>
-            </a:r>
-          </a:p>
-          <a:p>
-            <a:endParaRPr lang="vi-VN" dirty="0"/>
-          </a:p>
-        </p:txBody>
-      </p:sp>
-    </p:spTree>
-    <p:extLst>
-      <p:ext uri="{BB962C8B-B14F-4D97-AF65-F5344CB8AC3E}">
-        <p14:creationId xmlns:p14="http://schemas.microsoft.com/office/powerpoint/2010/main" val="2307719708"/>
       </p:ext>
     </p:extLst>
   </p:cSld>
@@ -4375,9 +4774,10 @@
           <a:lstStyle/>
           <a:p>
             <a:r>
-              <a:rPr lang="vi-VN" dirty="0"/>
-              <a:t>Technical</a:t>
-            </a:r>
+              <a:rPr lang="en-US" dirty="0"/>
+              <a:t>Product</a:t>
+            </a:r>
+            <a:endParaRPr lang="vi-VN" dirty="0"/>
           </a:p>
         </p:txBody>
       </p:sp>
@@ -4397,40 +4797,41 @@
           <a:lstStyle/>
           <a:p>
             <a:r>
-              <a:rPr lang="vi-VN" dirty="0"/>
-              <a:t>Using Winform on Visual Studio</a:t>
-            </a:r>
-          </a:p>
-          <a:p>
-            <a:r>
-              <a:rPr lang="vi-VN" dirty="0"/>
-              <a:t>Datatabase: Microsoft SQL Server</a:t>
-            </a:r>
-          </a:p>
-          <a:p>
-            <a:r>
-              <a:rPr lang="vi-VN" dirty="0"/>
-              <a:t>Framework: ADO.net entity</a:t>
-            </a:r>
-          </a:p>
-          <a:p>
-            <a:r>
-              <a:rPr lang="vi-VN" dirty="0"/>
-              <a:t>Git control: Github</a:t>
-            </a:r>
-          </a:p>
-          <a:p>
-            <a:r>
-              <a:rPr lang="vi-VN" dirty="0"/>
-              <a:t>Project link: https://github.com/pvtrieu/DrinkStore</a:t>
-            </a:r>
+              <a:rPr lang="en-US" dirty="0"/>
+              <a:t>View all product</a:t>
+            </a:r>
+          </a:p>
+          <a:p>
+            <a:r>
+              <a:rPr lang="en-US" dirty="0"/>
+              <a:t>Search product by name, category, brand</a:t>
+            </a:r>
+          </a:p>
+          <a:p>
+            <a:r>
+              <a:rPr lang="en-US" dirty="0"/>
+              <a:t>Add new product</a:t>
+            </a:r>
+          </a:p>
+          <a:p>
+            <a:r>
+              <a:rPr lang="en-US" dirty="0"/>
+              <a:t>Update, delete product</a:t>
+            </a:r>
+          </a:p>
+          <a:p>
+            <a:r>
+              <a:rPr lang="en-US" dirty="0"/>
+              <a:t>Add new category, brand</a:t>
+            </a:r>
+            <a:endParaRPr lang="vi-VN" dirty="0"/>
           </a:p>
         </p:txBody>
       </p:sp>
     </p:spTree>
     <p:extLst>
       <p:ext uri="{BB962C8B-B14F-4D97-AF65-F5344CB8AC3E}">
-        <p14:creationId xmlns:p14="http://schemas.microsoft.com/office/powerpoint/2010/main" val="2405978857"/>
+        <p14:creationId xmlns:p14="http://schemas.microsoft.com/office/powerpoint/2010/main" val="1673553418"/>
       </p:ext>
     </p:extLst>
   </p:cSld>
@@ -4474,6 +4875,300 @@
           <a:p>
             <a:r>
               <a:rPr lang="en-US" dirty="0"/>
+              <a:t>Import</a:t>
+            </a:r>
+            <a:endParaRPr lang="vi-VN" dirty="0"/>
+          </a:p>
+        </p:txBody>
+      </p:sp>
+      <p:sp>
+        <p:nvSpPr>
+          <p:cNvPr id="3" name="Content Placeholder 2"/>
+          <p:cNvSpPr>
+            <a:spLocks noGrp="1"/>
+          </p:cNvSpPr>
+          <p:nvPr>
+            <p:ph idx="1"/>
+          </p:nvPr>
+        </p:nvSpPr>
+        <p:spPr/>
+        <p:txBody>
+          <a:bodyPr/>
+          <a:lstStyle/>
+          <a:p>
+            <a:r>
+              <a:rPr lang="en-US" dirty="0"/>
+              <a:t>View all import</a:t>
+            </a:r>
+          </a:p>
+          <a:p>
+            <a:r>
+              <a:rPr lang="en-US" dirty="0"/>
+              <a:t>Search import by name, product, category, brand supplier</a:t>
+            </a:r>
+          </a:p>
+          <a:p>
+            <a:r>
+              <a:rPr lang="en-US" dirty="0"/>
+              <a:t>Add new import</a:t>
+            </a:r>
+          </a:p>
+          <a:p>
+            <a:r>
+              <a:rPr lang="en-US" dirty="0"/>
+              <a:t>Update, delete product</a:t>
+            </a:r>
+          </a:p>
+          <a:p>
+            <a:r>
+              <a:rPr lang="en-US" dirty="0"/>
+              <a:t>Add new supplier</a:t>
+            </a:r>
+            <a:endParaRPr lang="vi-VN" dirty="0"/>
+          </a:p>
+          <a:p>
+            <a:endParaRPr lang="vi-VN" dirty="0"/>
+          </a:p>
+        </p:txBody>
+      </p:sp>
+    </p:spTree>
+    <p:extLst>
+      <p:ext uri="{BB962C8B-B14F-4D97-AF65-F5344CB8AC3E}">
+        <p14:creationId xmlns:p14="http://schemas.microsoft.com/office/powerpoint/2010/main" val="2307455391"/>
+      </p:ext>
+    </p:extLst>
+  </p:cSld>
+  <p:clrMapOvr>
+    <a:masterClrMapping/>
+  </p:clrMapOvr>
+</p:sld>
+</file>
+
+<file path=ppt/slides/slide6.xml><?xml version="1.0" encoding="utf-8"?>
+<p:sld xmlns:a="http://schemas.openxmlformats.org/drawingml/2006/main" xmlns:r="http://schemas.openxmlformats.org/officeDocument/2006/relationships" xmlns:p="http://schemas.openxmlformats.org/presentationml/2006/main">
+  <p:cSld>
+    <p:spTree>
+      <p:nvGrpSpPr>
+        <p:cNvPr id="1" name=""/>
+        <p:cNvGrpSpPr/>
+        <p:nvPr/>
+      </p:nvGrpSpPr>
+      <p:grpSpPr>
+        <a:xfrm>
+          <a:off x="0" y="0"/>
+          <a:ext cx="0" cy="0"/>
+          <a:chOff x="0" y="0"/>
+          <a:chExt cx="0" cy="0"/>
+        </a:xfrm>
+      </p:grpSpPr>
+      <p:sp>
+        <p:nvSpPr>
+          <p:cNvPr id="2" name="Title 1"/>
+          <p:cNvSpPr>
+            <a:spLocks noGrp="1"/>
+          </p:cNvSpPr>
+          <p:nvPr>
+            <p:ph type="title"/>
+          </p:nvPr>
+        </p:nvSpPr>
+        <p:spPr/>
+        <p:txBody>
+          <a:bodyPr/>
+          <a:lstStyle/>
+          <a:p>
+            <a:r>
+              <a:rPr lang="en-US" dirty="0"/>
+              <a:t>Order</a:t>
+            </a:r>
+            <a:endParaRPr lang="vi-VN" dirty="0"/>
+          </a:p>
+        </p:txBody>
+      </p:sp>
+      <p:sp>
+        <p:nvSpPr>
+          <p:cNvPr id="3" name="Content Placeholder 2"/>
+          <p:cNvSpPr>
+            <a:spLocks noGrp="1"/>
+          </p:cNvSpPr>
+          <p:nvPr>
+            <p:ph idx="1"/>
+          </p:nvPr>
+        </p:nvSpPr>
+        <p:spPr/>
+        <p:txBody>
+          <a:bodyPr/>
+          <a:lstStyle/>
+          <a:p>
+            <a:r>
+              <a:rPr lang="en-US" dirty="0"/>
+              <a:t>View all order</a:t>
+            </a:r>
+          </a:p>
+          <a:p>
+            <a:r>
+              <a:rPr lang="en-US" dirty="0"/>
+              <a:t>Search order by date</a:t>
+            </a:r>
+          </a:p>
+          <a:p>
+            <a:r>
+              <a:rPr lang="en-US" dirty="0"/>
+              <a:t>Add new order and order details</a:t>
+            </a:r>
+          </a:p>
+          <a:p>
+            <a:r>
+              <a:rPr lang="en-US" dirty="0"/>
+              <a:t>Update, delete order</a:t>
+            </a:r>
+          </a:p>
+        </p:txBody>
+      </p:sp>
+    </p:spTree>
+    <p:extLst>
+      <p:ext uri="{BB962C8B-B14F-4D97-AF65-F5344CB8AC3E}">
+        <p14:creationId xmlns:p14="http://schemas.microsoft.com/office/powerpoint/2010/main" val="1116702949"/>
+      </p:ext>
+    </p:extLst>
+  </p:cSld>
+  <p:clrMapOvr>
+    <a:masterClrMapping/>
+  </p:clrMapOvr>
+</p:sld>
+</file>
+
+<file path=ppt/slides/slide7.xml><?xml version="1.0" encoding="utf-8"?>
+<p:sld xmlns:a="http://schemas.openxmlformats.org/drawingml/2006/main" xmlns:r="http://schemas.openxmlformats.org/officeDocument/2006/relationships" xmlns:p="http://schemas.openxmlformats.org/presentationml/2006/main">
+  <p:cSld>
+    <p:spTree>
+      <p:nvGrpSpPr>
+        <p:cNvPr id="1" name=""/>
+        <p:cNvGrpSpPr/>
+        <p:nvPr/>
+      </p:nvGrpSpPr>
+      <p:grpSpPr>
+        <a:xfrm>
+          <a:off x="0" y="0"/>
+          <a:ext cx="0" cy="0"/>
+          <a:chOff x="0" y="0"/>
+          <a:chExt cx="0" cy="0"/>
+        </a:xfrm>
+      </p:grpSpPr>
+      <p:sp>
+        <p:nvSpPr>
+          <p:cNvPr id="2" name="Title 1"/>
+          <p:cNvSpPr>
+            <a:spLocks noGrp="1"/>
+          </p:cNvSpPr>
+          <p:nvPr>
+            <p:ph type="title"/>
+          </p:nvPr>
+        </p:nvSpPr>
+        <p:spPr/>
+        <p:txBody>
+          <a:bodyPr/>
+          <a:lstStyle/>
+          <a:p>
+            <a:r>
+              <a:rPr lang="vi-VN" dirty="0"/>
+              <a:t>Technical</a:t>
+            </a:r>
+          </a:p>
+        </p:txBody>
+      </p:sp>
+      <p:sp>
+        <p:nvSpPr>
+          <p:cNvPr id="3" name="Content Placeholder 2"/>
+          <p:cNvSpPr>
+            <a:spLocks noGrp="1"/>
+          </p:cNvSpPr>
+          <p:nvPr>
+            <p:ph idx="1"/>
+          </p:nvPr>
+        </p:nvSpPr>
+        <p:spPr/>
+        <p:txBody>
+          <a:bodyPr/>
+          <a:lstStyle/>
+          <a:p>
+            <a:r>
+              <a:rPr lang="vi-VN" dirty="0"/>
+              <a:t>Using Winform on Visual Studio</a:t>
+            </a:r>
+          </a:p>
+          <a:p>
+            <a:r>
+              <a:rPr lang="vi-VN" dirty="0"/>
+              <a:t>Datatabase: Microsoft SQL Server</a:t>
+            </a:r>
+          </a:p>
+          <a:p>
+            <a:r>
+              <a:rPr lang="vi-VN" dirty="0"/>
+              <a:t>Framework: ADO.net entity</a:t>
+            </a:r>
+          </a:p>
+          <a:p>
+            <a:r>
+              <a:rPr lang="vi-VN" dirty="0"/>
+              <a:t>Git control: Github</a:t>
+            </a:r>
+          </a:p>
+          <a:p>
+            <a:r>
+              <a:rPr lang="vi-VN" dirty="0"/>
+              <a:t>Project link: https://github.com/pvtrieu/DrinkStore</a:t>
+            </a:r>
+          </a:p>
+        </p:txBody>
+      </p:sp>
+    </p:spTree>
+    <p:extLst>
+      <p:ext uri="{BB962C8B-B14F-4D97-AF65-F5344CB8AC3E}">
+        <p14:creationId xmlns:p14="http://schemas.microsoft.com/office/powerpoint/2010/main" val="2405978857"/>
+      </p:ext>
+    </p:extLst>
+  </p:cSld>
+  <p:clrMapOvr>
+    <a:masterClrMapping/>
+  </p:clrMapOvr>
+</p:sld>
+</file>
+
+<file path=ppt/slides/slide8.xml><?xml version="1.0" encoding="utf-8"?>
+<p:sld xmlns:a="http://schemas.openxmlformats.org/drawingml/2006/main" xmlns:r="http://schemas.openxmlformats.org/officeDocument/2006/relationships" xmlns:p="http://schemas.openxmlformats.org/presentationml/2006/main">
+  <p:cSld>
+    <p:spTree>
+      <p:nvGrpSpPr>
+        <p:cNvPr id="1" name=""/>
+        <p:cNvGrpSpPr/>
+        <p:nvPr/>
+      </p:nvGrpSpPr>
+      <p:grpSpPr>
+        <a:xfrm>
+          <a:off x="0" y="0"/>
+          <a:ext cx="0" cy="0"/>
+          <a:chOff x="0" y="0"/>
+          <a:chExt cx="0" cy="0"/>
+        </a:xfrm>
+      </p:grpSpPr>
+      <p:sp>
+        <p:nvSpPr>
+          <p:cNvPr id="2" name="Title 1"/>
+          <p:cNvSpPr>
+            <a:spLocks noGrp="1"/>
+          </p:cNvSpPr>
+          <p:nvPr>
+            <p:ph type="title"/>
+          </p:nvPr>
+        </p:nvSpPr>
+        <p:spPr/>
+        <p:txBody>
+          <a:bodyPr/>
+          <a:lstStyle/>
+          <a:p>
+            <a:r>
+              <a:rPr lang="en-US" dirty="0"/>
               <a:t>Member </a:t>
             </a:r>
             <a:br>
@@ -4504,14 +5199,14 @@
             <p:ph idx="1"/>
             <p:extLst>
               <p:ext uri="{D42A27DB-BD31-4B8C-83A1-F6EECF244321}">
-                <p14:modId xmlns:p14="http://schemas.microsoft.com/office/powerpoint/2010/main" val="2097325465"/>
+                <p14:modId xmlns:p14="http://schemas.microsoft.com/office/powerpoint/2010/main" val="3279657461"/>
               </p:ext>
             </p:extLst>
           </p:nvPr>
         </p:nvGraphicFramePr>
         <p:xfrm>
           <a:off x="2981067" y="837207"/>
-          <a:ext cx="5486401" cy="4366260"/>
+          <a:ext cx="5486401" cy="4037108"/>
         </p:xfrm>
         <a:graphic>
           <a:graphicData uri="http://schemas.openxmlformats.org/drawingml/2006/table">
@@ -4755,7 +5450,7 @@
                   </a:ext>
                 </a:extLst>
               </a:tr>
-              <a:tr h="480060">
+              <a:tr h="301817">
                 <a:tc>
                   <a:txBody>
                     <a:bodyPr/>
@@ -4787,23 +5482,13 @@
                     <a:bodyPr/>
                     <a:lstStyle/>
                     <a:p>
-                      <a:pPr marL="285750" indent="-285750">
-                        <a:buFontTx/>
-                        <a:buChar char="-"/>
-                      </a:pPr>
-                      <a:r>
-                        <a:rPr lang="vi-VN" sz="1400" dirty="0"/>
-                        <a:t>Finished 4 main form</a:t>
-                      </a:r>
-                    </a:p>
-                    <a:p>
                       <a:pPr marL="0" indent="0">
                         <a:buFontTx/>
                         <a:buNone/>
                       </a:pPr>
                       <a:r>
                         <a:rPr lang="vi-VN" sz="1400" dirty="0"/>
-                        <a:t>-  3 more to completed</a:t>
+                        <a:t>Complete</a:t>
                       </a:r>
                     </a:p>
                   </a:txBody>
@@ -4863,7 +5548,7 @@
                       </a:pPr>
                       <a:r>
                         <a:rPr lang="vi-VN" sz="1400" dirty="0"/>
-                        <a:t>Not input sample data yet</a:t>
+                        <a:t>Have some sample data</a:t>
                       </a:r>
                     </a:p>
                   </a:txBody>
@@ -4875,7 +5560,7 @@
                   </a:ext>
                 </a:extLst>
               </a:tr>
-              <a:tr h="278130">
+              <a:tr h="359631">
                 <a:tc>
                   <a:txBody>
                     <a:bodyPr/>
@@ -4909,7 +5594,7 @@
                     <a:p>
                       <a:r>
                         <a:rPr lang="vi-VN" sz="1400" dirty="0"/>
-                        <a:t>-  Done 70%</a:t>
+                        <a:t>Complete</a:t>
                       </a:r>
                     </a:p>
                   </a:txBody>
@@ -4929,7 +5614,7 @@
                     <a:p>
                       <a:r>
                         <a:rPr lang="vi-VN" sz="1400" dirty="0"/>
-                        <a:t>DataLayer</a:t>
+                        <a:t>Order</a:t>
                       </a:r>
                     </a:p>
                   </a:txBody>
@@ -4955,7 +5640,7 @@
                     <a:p>
                       <a:r>
                         <a:rPr lang="vi-VN" sz="1400" dirty="0"/>
-                        <a:t>Not started yet</a:t>
+                        <a:t>50%</a:t>
                       </a:r>
                     </a:p>
                   </a:txBody>
@@ -4975,7 +5660,7 @@
                     <a:p>
                       <a:r>
                         <a:rPr lang="vi-VN" sz="1400" dirty="0"/>
-                        <a:t>BussinesLayer</a:t>
+                        <a:t>Import</a:t>
                       </a:r>
                     </a:p>
                   </a:txBody>
@@ -5018,7 +5703,7 @@
                       </a:pPr>
                       <a:r>
                         <a:rPr lang="vi-VN" sz="1400" dirty="0"/>
-                        <a:t>Not started yet</a:t>
+                        <a:t>70%</a:t>
                       </a:r>
                     </a:p>
                   </a:txBody>
@@ -5038,7 +5723,7 @@
                     <a:p>
                       <a:r>
                         <a:rPr lang="vi-VN" sz="1400" dirty="0"/>
-                        <a:t>PresentasionLayer</a:t>
+                        <a:t>Product</a:t>
                       </a:r>
                     </a:p>
                   </a:txBody>
@@ -5081,7 +5766,7 @@
                       </a:pPr>
                       <a:r>
                         <a:rPr lang="vi-VN" sz="1400" dirty="0"/>
-                        <a:t>Not started yet</a:t>
+                        <a:t>95%</a:t>
                       </a:r>
                     </a:p>
                   </a:txBody>
@@ -5101,7 +5786,7 @@
                     <a:p>
                       <a:r>
                         <a:rPr lang="vi-VN" sz="1400" dirty="0"/>
-                        <a:t>Testing</a:t>
+                        <a:t>Testing and debug</a:t>
                       </a:r>
                     </a:p>
                   </a:txBody>
@@ -5173,7 +5858,7 @@
 </p:sld>
 </file>
 
-<file path=ppt/slides/slide6.xml><?xml version="1.0" encoding="utf-8"?>
+<file path=ppt/slides/slide9.xml><?xml version="1.0" encoding="utf-8"?>
 <p:sld xmlns:a="http://schemas.openxmlformats.org/drawingml/2006/main" xmlns:r="http://schemas.openxmlformats.org/officeDocument/2006/relationships" xmlns:p="http://schemas.openxmlformats.org/presentationml/2006/main">
   <p:cSld>
     <p:spTree>
@@ -5244,238 +5929,6 @@
     <p:extLst>
       <p:ext uri="{BB962C8B-B14F-4D97-AF65-F5344CB8AC3E}">
         <p14:creationId xmlns:p14="http://schemas.microsoft.com/office/powerpoint/2010/main" val="553232669"/>
-      </p:ext>
-    </p:extLst>
-  </p:cSld>
-  <p:clrMapOvr>
-    <a:masterClrMapping/>
-  </p:clrMapOvr>
-</p:sld>
-</file>
-
-<file path=ppt/slides/slide7.xml><?xml version="1.0" encoding="utf-8"?>
-<p:sld xmlns:a="http://schemas.openxmlformats.org/drawingml/2006/main" xmlns:r="http://schemas.openxmlformats.org/officeDocument/2006/relationships" xmlns:p="http://schemas.openxmlformats.org/presentationml/2006/main">
-  <p:cSld>
-    <p:spTree>
-      <p:nvGrpSpPr>
-        <p:cNvPr id="1" name=""/>
-        <p:cNvGrpSpPr/>
-        <p:nvPr/>
-      </p:nvGrpSpPr>
-      <p:grpSpPr>
-        <a:xfrm>
-          <a:off x="0" y="0"/>
-          <a:ext cx="0" cy="0"/>
-          <a:chOff x="0" y="0"/>
-          <a:chExt cx="0" cy="0"/>
-        </a:xfrm>
-      </p:grpSpPr>
-      <p:sp>
-        <p:nvSpPr>
-          <p:cNvPr id="2" name="Title 1"/>
-          <p:cNvSpPr>
-            <a:spLocks noGrp="1"/>
-          </p:cNvSpPr>
-          <p:nvPr>
-            <p:ph type="title"/>
-          </p:nvPr>
-        </p:nvSpPr>
-        <p:spPr/>
-        <p:txBody>
-          <a:bodyPr/>
-          <a:lstStyle/>
-          <a:p>
-            <a:r>
-              <a:rPr lang="vi-VN" dirty="0"/>
-              <a:t>ERD</a:t>
-            </a:r>
-          </a:p>
-        </p:txBody>
-      </p:sp>
-      <p:pic>
-        <p:nvPicPr>
-          <p:cNvPr id="5" name="Content Placeholder 4"/>
-          <p:cNvPicPr>
-            <a:picLocks noGrp="1" noChangeAspect="1"/>
-          </p:cNvPicPr>
-          <p:nvPr>
-            <p:ph idx="1"/>
-          </p:nvPr>
-        </p:nvPicPr>
-        <p:blipFill>
-          <a:blip r:embed="rId2"/>
-          <a:stretch>
-            <a:fillRect/>
-          </a:stretch>
-        </p:blipFill>
-        <p:spPr>
-          <a:xfrm>
-            <a:off x="2703443" y="265043"/>
-            <a:ext cx="5684907" cy="6042992"/>
-          </a:xfrm>
-        </p:spPr>
-      </p:pic>
-    </p:spTree>
-    <p:extLst>
-      <p:ext uri="{BB962C8B-B14F-4D97-AF65-F5344CB8AC3E}">
-        <p14:creationId xmlns:p14="http://schemas.microsoft.com/office/powerpoint/2010/main" val="606729081"/>
-      </p:ext>
-    </p:extLst>
-  </p:cSld>
-  <p:clrMapOvr>
-    <a:masterClrMapping/>
-  </p:clrMapOvr>
-</p:sld>
-</file>
-
-<file path=ppt/slides/slide8.xml><?xml version="1.0" encoding="utf-8"?>
-<p:sld xmlns:a="http://schemas.openxmlformats.org/drawingml/2006/main" xmlns:r="http://schemas.openxmlformats.org/officeDocument/2006/relationships" xmlns:p="http://schemas.openxmlformats.org/presentationml/2006/main">
-  <p:cSld>
-    <p:spTree>
-      <p:nvGrpSpPr>
-        <p:cNvPr id="1" name=""/>
-        <p:cNvGrpSpPr/>
-        <p:nvPr/>
-      </p:nvGrpSpPr>
-      <p:grpSpPr>
-        <a:xfrm>
-          <a:off x="0" y="0"/>
-          <a:ext cx="0" cy="0"/>
-          <a:chOff x="0" y="0"/>
-          <a:chExt cx="0" cy="0"/>
-        </a:xfrm>
-      </p:grpSpPr>
-      <p:sp>
-        <p:nvSpPr>
-          <p:cNvPr id="2" name="Title 1"/>
-          <p:cNvSpPr>
-            <a:spLocks noGrp="1"/>
-          </p:cNvSpPr>
-          <p:nvPr>
-            <p:ph type="title"/>
-          </p:nvPr>
-        </p:nvSpPr>
-        <p:spPr/>
-        <p:txBody>
-          <a:bodyPr/>
-          <a:lstStyle/>
-          <a:p>
-            <a:r>
-              <a:rPr lang="vi-VN" dirty="0"/>
-              <a:t>UML</a:t>
-            </a:r>
-          </a:p>
-        </p:txBody>
-      </p:sp>
-      <p:pic>
-        <p:nvPicPr>
-          <p:cNvPr id="7" name="Content Placeholder 6"/>
-          <p:cNvPicPr>
-            <a:picLocks noGrp="1" noChangeAspect="1"/>
-          </p:cNvPicPr>
-          <p:nvPr>
-            <p:ph idx="1"/>
-          </p:nvPr>
-        </p:nvPicPr>
-        <p:blipFill>
-          <a:blip r:embed="rId2"/>
-          <a:stretch>
-            <a:fillRect/>
-          </a:stretch>
-        </p:blipFill>
-        <p:spPr>
-          <a:xfrm>
-            <a:off x="2901950" y="410817"/>
-            <a:ext cx="5486400" cy="5645426"/>
-          </a:xfrm>
-        </p:spPr>
-      </p:pic>
-    </p:spTree>
-    <p:extLst>
-      <p:ext uri="{BB962C8B-B14F-4D97-AF65-F5344CB8AC3E}">
-        <p14:creationId xmlns:p14="http://schemas.microsoft.com/office/powerpoint/2010/main" val="1998424779"/>
-      </p:ext>
-    </p:extLst>
-  </p:cSld>
-  <p:clrMapOvr>
-    <a:masterClrMapping/>
-  </p:clrMapOvr>
-</p:sld>
-</file>
-
-<file path=ppt/slides/slide9.xml><?xml version="1.0" encoding="utf-8"?>
-<p:sld xmlns:a="http://schemas.openxmlformats.org/drawingml/2006/main" xmlns:r="http://schemas.openxmlformats.org/officeDocument/2006/relationships" xmlns:p="http://schemas.openxmlformats.org/presentationml/2006/main">
-  <p:cSld>
-    <p:spTree>
-      <p:nvGrpSpPr>
-        <p:cNvPr id="1" name=""/>
-        <p:cNvGrpSpPr/>
-        <p:nvPr/>
-      </p:nvGrpSpPr>
-      <p:grpSpPr>
-        <a:xfrm>
-          <a:off x="0" y="0"/>
-          <a:ext cx="0" cy="0"/>
-          <a:chOff x="0" y="0"/>
-          <a:chExt cx="0" cy="0"/>
-        </a:xfrm>
-      </p:grpSpPr>
-      <p:sp>
-        <p:nvSpPr>
-          <p:cNvPr id="2" name="Title 1"/>
-          <p:cNvSpPr>
-            <a:spLocks noGrp="1"/>
-          </p:cNvSpPr>
-          <p:nvPr>
-            <p:ph type="title"/>
-          </p:nvPr>
-        </p:nvSpPr>
-        <p:spPr/>
-        <p:txBody>
-          <a:bodyPr/>
-          <a:lstStyle/>
-          <a:p>
-            <a:r>
-              <a:rPr lang="vi-VN" dirty="0"/>
-              <a:t>Login Sequence</a:t>
-            </a:r>
-            <a:br>
-              <a:rPr lang="vi-VN" dirty="0"/>
-            </a:br>
-            <a:r>
-              <a:rPr lang="vi-VN" dirty="0"/>
-              <a:t>diagram</a:t>
-            </a:r>
-          </a:p>
-        </p:txBody>
-      </p:sp>
-      <p:pic>
-        <p:nvPicPr>
-          <p:cNvPr id="5" name="Content Placeholder 4" descr="A picture containing screenshot&#10;&#10;Description generated with very high confidence"/>
-          <p:cNvPicPr>
-            <a:picLocks noGrp="1" noChangeAspect="1"/>
-          </p:cNvPicPr>
-          <p:nvPr>
-            <p:ph idx="1"/>
-          </p:nvPr>
-        </p:nvPicPr>
-        <p:blipFill>
-          <a:blip r:embed="rId2"/>
-          <a:stretch>
-            <a:fillRect/>
-          </a:stretch>
-        </p:blipFill>
-        <p:spPr>
-          <a:xfrm>
-            <a:off x="2716419" y="692363"/>
-            <a:ext cx="5802634" cy="4873549"/>
-          </a:xfrm>
-        </p:spPr>
-      </p:pic>
-    </p:spTree>
-    <p:extLst>
-      <p:ext uri="{BB962C8B-B14F-4D97-AF65-F5344CB8AC3E}">
-        <p14:creationId xmlns:p14="http://schemas.microsoft.com/office/powerpoint/2010/main" val="2184775498"/>
       </p:ext>
     </p:extLst>
   </p:cSld>

</xml_diff>